<commit_message>
Updated repo in pptx, created pdf
</commit_message>
<xml_diff>
--- a/test_driven_data_wrangling_r.pptx
+++ b/test_driven_data_wrangling_r.pptx
@@ -218,7 +218,7 @@
           <a:p>
             <a:fld id="{17119444-0EAC-46C4-8C7F-BECA04876CB2}" type="datetimeFigureOut">
               <a:rPr lang="en-US" smtClean="0"/>
-              <a:t>8/15/2018</a:t>
+              <a:t>8/16/2018</a:t>
             </a:fld>
             <a:endParaRPr lang="en-US"/>
           </a:p>
@@ -1257,7 +1257,7 @@
           <a:p>
             <a:fld id="{BE86D659-235A-4480-A52F-151100DCBC9E}" type="datetimeFigureOut">
               <a:rPr lang="en-US" smtClean="0"/>
-              <a:t>8/15/2018</a:t>
+              <a:t>8/16/2018</a:t>
             </a:fld>
             <a:endParaRPr lang="en-US"/>
           </a:p>
@@ -1425,7 +1425,7 @@
           <a:p>
             <a:fld id="{BE86D659-235A-4480-A52F-151100DCBC9E}" type="datetimeFigureOut">
               <a:rPr lang="en-US" smtClean="0"/>
-              <a:t>8/15/2018</a:t>
+              <a:t>8/16/2018</a:t>
             </a:fld>
             <a:endParaRPr lang="en-US"/>
           </a:p>
@@ -1603,7 +1603,7 @@
           <a:p>
             <a:fld id="{BE86D659-235A-4480-A52F-151100DCBC9E}" type="datetimeFigureOut">
               <a:rPr lang="en-US" smtClean="0"/>
-              <a:t>8/15/2018</a:t>
+              <a:t>8/16/2018</a:t>
             </a:fld>
             <a:endParaRPr lang="en-US"/>
           </a:p>
@@ -1771,7 +1771,7 @@
           <a:p>
             <a:fld id="{BE86D659-235A-4480-A52F-151100DCBC9E}" type="datetimeFigureOut">
               <a:rPr lang="en-US" smtClean="0"/>
-              <a:t>8/15/2018</a:t>
+              <a:t>8/16/2018</a:t>
             </a:fld>
             <a:endParaRPr lang="en-US"/>
           </a:p>
@@ -2016,7 +2016,7 @@
           <a:p>
             <a:fld id="{BE86D659-235A-4480-A52F-151100DCBC9E}" type="datetimeFigureOut">
               <a:rPr lang="en-US" smtClean="0"/>
-              <a:t>8/15/2018</a:t>
+              <a:t>8/16/2018</a:t>
             </a:fld>
             <a:endParaRPr lang="en-US"/>
           </a:p>
@@ -2245,7 +2245,7 @@
           <a:p>
             <a:fld id="{BE86D659-235A-4480-A52F-151100DCBC9E}" type="datetimeFigureOut">
               <a:rPr lang="en-US" smtClean="0"/>
-              <a:t>8/15/2018</a:t>
+              <a:t>8/16/2018</a:t>
             </a:fld>
             <a:endParaRPr lang="en-US"/>
           </a:p>
@@ -2609,7 +2609,7 @@
           <a:p>
             <a:fld id="{BE86D659-235A-4480-A52F-151100DCBC9E}" type="datetimeFigureOut">
               <a:rPr lang="en-US" smtClean="0"/>
-              <a:t>8/15/2018</a:t>
+              <a:t>8/16/2018</a:t>
             </a:fld>
             <a:endParaRPr lang="en-US"/>
           </a:p>
@@ -2726,7 +2726,7 @@
           <a:p>
             <a:fld id="{BE86D659-235A-4480-A52F-151100DCBC9E}" type="datetimeFigureOut">
               <a:rPr lang="en-US" smtClean="0"/>
-              <a:t>8/15/2018</a:t>
+              <a:t>8/16/2018</a:t>
             </a:fld>
             <a:endParaRPr lang="en-US"/>
           </a:p>
@@ -2821,7 +2821,7 @@
           <a:p>
             <a:fld id="{BE86D659-235A-4480-A52F-151100DCBC9E}" type="datetimeFigureOut">
               <a:rPr lang="en-US" smtClean="0"/>
-              <a:t>8/15/2018</a:t>
+              <a:t>8/16/2018</a:t>
             </a:fld>
             <a:endParaRPr lang="en-US"/>
           </a:p>
@@ -3096,7 +3096,7 @@
           <a:p>
             <a:fld id="{BE86D659-235A-4480-A52F-151100DCBC9E}" type="datetimeFigureOut">
               <a:rPr lang="en-US" smtClean="0"/>
-              <a:t>8/15/2018</a:t>
+              <a:t>8/16/2018</a:t>
             </a:fld>
             <a:endParaRPr lang="en-US"/>
           </a:p>
@@ -3348,7 +3348,7 @@
           <a:p>
             <a:fld id="{BE86D659-235A-4480-A52F-151100DCBC9E}" type="datetimeFigureOut">
               <a:rPr lang="en-US" smtClean="0"/>
-              <a:t>8/15/2018</a:t>
+              <a:t>8/16/2018</a:t>
             </a:fld>
             <a:endParaRPr lang="en-US"/>
           </a:p>
@@ -3559,7 +3559,7 @@
           <a:p>
             <a:fld id="{BE86D659-235A-4480-A52F-151100DCBC9E}" type="datetimeFigureOut">
               <a:rPr lang="en-US" smtClean="0"/>
-              <a:t>8/15/2018</a:t>
+              <a:t>8/16/2018</a:t>
             </a:fld>
             <a:endParaRPr lang="en-US"/>
           </a:p>
@@ -4056,14 +4056,11 @@
           </a:p>
           <a:p>
             <a:r>
-              <a:rPr lang="en-US" i="1" dirty="0">
+              <a:rPr lang="en-US" i="1">
                 <a:hlinkClick r:id="rId3"/>
               </a:rPr>
-              <a:t>https://github.com/donaldsawyer/phdata-tdd-r</a:t>
-            </a:r>
-            <a:endParaRPr lang="en-US" i="1" dirty="0"/>
-          </a:p>
-          <a:p>
+              <a:t>https://github.com/donaldsawyer/test-driven-data-wrangling-r</a:t>
+            </a:r>
             <a:endParaRPr lang="en-US" i="1" dirty="0"/>
           </a:p>
         </p:txBody>

</xml_diff>